<commit_message>
Updated for Singapore Workshop
</commit_message>
<xml_diff>
--- a/presentations/6-Wrapup.pptx
+++ b/presentations/6-Wrapup.pptx
@@ -197,7 +197,7 @@
           <a:p>
             <a:fld id="{7B47E9F9-6557-4923-BE10-1C342566E3EE}" type="datetimeFigureOut">
               <a:rPr lang="en-US" smtClean="0"/>
-              <a:t>8/23/17</a:t>
+              <a:t>9/28/17</a:t>
             </a:fld>
             <a:endParaRPr lang="en-US"/>
           </a:p>
@@ -7851,18 +7851,10 @@
                   <a:schemeClr val="bg1"/>
                 </a:solidFill>
               </a:rPr>
-              <a:t>Pittsburgh</a:t>
-            </a:r>
-            <a:r>
-              <a:rPr lang="en-US" sz="1400" b="1" smtClean="0">
-                <a:solidFill>
-                  <a:schemeClr val="bg1"/>
-                </a:solidFill>
-              </a:rPr>
-              <a:t>– Aug 24</a:t>
-            </a:r>
-            <a:r>
-              <a:rPr lang="en-US" sz="1400" b="1" baseline="30000" smtClean="0">
+              <a:t>Singapore– Sep 28</a:t>
+            </a:r>
+            <a:r>
+              <a:rPr lang="en-US" sz="1400" b="1" baseline="30000" dirty="0" smtClean="0">
                 <a:solidFill>
                   <a:schemeClr val="bg1"/>
                 </a:solidFill>
@@ -7870,7 +7862,7 @@
               <a:t>th</a:t>
             </a:r>
             <a:r>
-              <a:rPr lang="en-US" sz="1400" b="1" smtClean="0">
+              <a:rPr lang="en-US" sz="1400" b="1" dirty="0" smtClean="0">
                 <a:solidFill>
                   <a:schemeClr val="bg1"/>
                 </a:solidFill>
@@ -7878,7 +7870,7 @@
               <a:t> </a:t>
             </a:r>
             <a:r>
-              <a:rPr lang="en-US" sz="1400" b="1">
+              <a:rPr lang="en-US" sz="1400" b="1" dirty="0">
                 <a:solidFill>
                   <a:schemeClr val="bg1"/>
                 </a:solidFill>
@@ -7886,7 +7878,7 @@
               <a:t>– </a:t>
             </a:r>
             <a:r>
-              <a:rPr lang="en-US" sz="1400" b="1" smtClean="0">
+              <a:rPr lang="en-US" sz="1400" b="1" dirty="0" smtClean="0">
                 <a:solidFill>
                   <a:schemeClr val="bg1"/>
                 </a:solidFill>
@@ -7915,31 +7907,15 @@
                   <a:schemeClr val="bg1"/>
                 </a:solidFill>
               </a:rPr>
-              <a:t>AM </a:t>
-            </a:r>
-            <a:r>
-              <a:rPr lang="en-US" sz="1400" b="1">
+              <a:t>AM – </a:t>
+            </a:r>
+            <a:r>
+              <a:rPr lang="en-US" sz="1400" b="1" dirty="0" smtClean="0">
                 <a:solidFill>
                   <a:schemeClr val="bg1"/>
                 </a:solidFill>
               </a:rPr>
-              <a:t>– </a:t>
-            </a:r>
-            <a:r>
-              <a:rPr lang="en-US" sz="1400" b="1" dirty="0">
-                <a:solidFill>
-                  <a:schemeClr val="bg1"/>
-                </a:solidFill>
-              </a:rPr>
-              <a:t>4</a:t>
-            </a:r>
-            <a:r>
-              <a:rPr lang="en-US" sz="1400" b="1" smtClean="0">
-                <a:solidFill>
-                  <a:schemeClr val="bg1"/>
-                </a:solidFill>
-              </a:rPr>
-              <a:t>:</a:t>
+              <a:t>3:</a:t>
             </a:r>
             <a:r>
               <a:rPr lang="en-US" sz="1400" b="1" dirty="0">
@@ -8090,11 +8066,7 @@
             </a:pPr>
             <a:r>
               <a:rPr lang="en-US" b="1" dirty="0" smtClean="0"/>
-              <a:t>Brian </a:t>
-            </a:r>
-            <a:r>
-              <a:rPr lang="en-US" b="1" dirty="0" err="1" smtClean="0"/>
-              <a:t>Jimerson</a:t>
+              <a:t>Mo Sous</a:t>
             </a:r>
             <a:endParaRPr lang="en-US" b="1" dirty="0" smtClean="0"/>
           </a:p>
@@ -8102,7 +8074,7 @@
             <a:pPr lvl="1"/>
             <a:r>
               <a:rPr lang="en-US" dirty="0" err="1" smtClean="0"/>
-              <a:t>bjimerson@pivotal.io</a:t>
+              <a:t>Mo.sous@dell.com</a:t>
             </a:r>
             <a:endParaRPr lang="en-US" dirty="0"/>
           </a:p>

</xml_diff>